<commit_message>
Worked on it last night and fell asleep so pushing right now
</commit_message>
<xml_diff>
--- a/presentation materials/matthews-journey-presentation.pptx
+++ b/presentation materials/matthews-journey-presentation.pptx
@@ -1253,7 +1253,7 @@
         <p:spPr>
           <a:xfrm>
             <a:off x="685800" y="1143000"/>
-            <a:ext cx="5484960" cy="3084840"/>
+            <a:ext cx="5484813" cy="3084513"/>
           </a:xfrm>
           <a:prstGeom prst="rect">
             <a:avLst/>
@@ -1302,7 +1302,7 @@
               </a:tabLst>
             </a:pPr>
             <a:r>
-              <a:rPr lang="en-US" sz="2000" b="0" strike="noStrike" spc="-1">
+              <a:rPr lang="en-US" sz="2000" b="0" strike="noStrike" spc="-1" dirty="0">
                 <a:solidFill>
                   <a:srgbClr val="000000"/>
                 </a:solidFill>
@@ -13527,7 +13527,7 @@
         </p:spPr>
         <p:txBody>
           <a:bodyPr lIns="91440" tIns="45720" rIns="91440" bIns="45720" anchor="t">
-            <a:normAutofit fontScale="93333"/>
+            <a:normAutofit fontScale="85833"/>
           </a:bodyPr>
           <a:lstStyle/>
           <a:p>
@@ -13543,7 +13543,7 @@
                 <a:tab pos="0" algn="l"/>
               </a:tabLst>
             </a:pPr>
-            <a:endParaRPr lang="en-US" sz="2000" b="0" strike="noStrike" spc="-1">
+            <a:endParaRPr lang="en-US" sz="2000" b="0" strike="noStrike" spc="-1" dirty="0">
               <a:solidFill>
                 <a:srgbClr val="FFFFFF"/>
               </a:solidFill>
@@ -13571,7 +13571,7 @@
               </a:tabLst>
             </a:pPr>
             <a:r>
-              <a:rPr lang="en-US" sz="2000" b="0" strike="noStrike" spc="-1">
+              <a:rPr lang="en-US" sz="2000" b="0" strike="noStrike" spc="-1" dirty="0">
                 <a:solidFill>
                   <a:schemeClr val="dk1"/>
                 </a:solidFill>
@@ -13579,7 +13579,7 @@
               </a:rPr>
               <a:t>User Story: As a player developer, I want elements in the environment for the player to interact with.</a:t>
             </a:r>
-            <a:endParaRPr lang="en-US" sz="2000" b="0" strike="noStrike" spc="-1">
+            <a:endParaRPr lang="en-US" sz="2000" b="0" strike="noStrike" spc="-1" dirty="0">
               <a:solidFill>
                 <a:srgbClr val="FFFFFF"/>
               </a:solidFill>
@@ -13607,7 +13607,7 @@
               </a:tabLst>
             </a:pPr>
             <a:r>
-              <a:rPr lang="en-US" sz="2000" b="0" strike="noStrike" spc="-1">
+              <a:rPr lang="en-US" sz="2000" b="0" strike="noStrike" spc="-1" dirty="0">
                 <a:solidFill>
                   <a:schemeClr val="dk1"/>
                 </a:solidFill>
@@ -13615,7 +13615,7 @@
               </a:rPr>
               <a:t>Requirement: There shall be items in the environment for the player to pickup</a:t>
             </a:r>
-            <a:endParaRPr lang="en-US" sz="2000" b="0" strike="noStrike" spc="-1">
+            <a:endParaRPr lang="en-US" sz="2000" b="0" strike="noStrike" spc="-1" dirty="0">
               <a:solidFill>
                 <a:srgbClr val="FFFFFF"/>
               </a:solidFill>
@@ -13641,7 +13641,7 @@
               </a:tabLst>
             </a:pPr>
             <a:r>
-              <a:rPr lang="en-US" sz="2000" b="0" strike="noStrike" spc="-1">
+              <a:rPr lang="en-US" sz="2000" b="0" strike="noStrike" spc="-1" dirty="0">
                 <a:solidFill>
                   <a:schemeClr val="dk1"/>
                 </a:solidFill>
@@ -13649,7 +13649,7 @@
               </a:rPr>
               <a:t>There shall be health pickups that will heal the players health</a:t>
             </a:r>
-            <a:endParaRPr lang="en-US" sz="2000" b="0" strike="noStrike" spc="-1">
+            <a:endParaRPr lang="en-US" sz="2000" b="0" strike="noStrike" spc="-1" dirty="0">
               <a:solidFill>
                 <a:srgbClr val="FFFFFF"/>
               </a:solidFill>
@@ -13675,7 +13675,7 @@
               </a:tabLst>
             </a:pPr>
             <a:r>
-              <a:rPr lang="en-US" sz="2000" b="0" strike="noStrike" spc="-1">
+              <a:rPr lang="en-US" sz="2000" b="0" strike="noStrike" spc="-1" dirty="0">
                 <a:solidFill>
                   <a:schemeClr val="dk1"/>
                 </a:solidFill>
@@ -13683,7 +13683,7 @@
               </a:rPr>
               <a:t>There shall be coin pickups </a:t>
             </a:r>
-            <a:endParaRPr lang="en-US" sz="2000" b="0" strike="noStrike" spc="-1">
+            <a:endParaRPr lang="en-US" sz="2000" b="0" strike="noStrike" spc="-1" dirty="0">
               <a:solidFill>
                 <a:srgbClr val="FFFFFF"/>
               </a:solidFill>
@@ -13708,20 +13708,77 @@
               </a:tabLst>
             </a:pPr>
             <a:r>
-              <a:rPr lang="en-US" sz="2000" b="0" strike="noStrike" spc="-1">
+              <a:rPr lang="en-US" sz="2000" b="0" strike="noStrike" spc="-1" dirty="0">
                 <a:solidFill>
                   <a:schemeClr val="dk1"/>
                 </a:solidFill>
                 <a:latin typeface="-apple-system"/>
               </a:rPr>
-              <a:t>Design:</a:t>
+              <a:t>Design</a:t>
             </a:r>
-            <a:endParaRPr lang="en-US" sz="2000" b="0" strike="noStrike" spc="-1">
-              <a:solidFill>
-                <a:srgbClr val="FFFFFF"/>
-              </a:solidFill>
-              <a:latin typeface="Arial"/>
-            </a:endParaRPr>
+            <a:r>
+              <a:rPr lang="en-US" sz="2000" spc="-1" dirty="0">
+                <a:solidFill>
+                  <a:schemeClr val="dk1"/>
+                </a:solidFill>
+                <a:latin typeface="-apple-system"/>
+              </a:rPr>
+              <a:t>: All items are automatically taken (with the exception of health items) when the player touches them. The items contribute to a counter and when the counter is modified (ex: var </a:t>
+            </a:r>
+            <a:r>
+              <a:rPr lang="en-US" sz="2000" spc="-1" dirty="0" err="1">
+                <a:solidFill>
+                  <a:schemeClr val="dk1"/>
+                </a:solidFill>
+                <a:latin typeface="-apple-system"/>
+              </a:rPr>
+              <a:t>current_</a:t>
+            </a:r>
+            <a:r>
+              <a:rPr lang="en-US" sz="2000" u="sng" spc="-1" dirty="0" err="1">
+                <a:solidFill>
+                  <a:schemeClr val="dk1"/>
+                </a:solidFill>
+                <a:latin typeface="-apple-system"/>
+              </a:rPr>
+              <a:t>blank</a:t>
+            </a:r>
+            <a:r>
+              <a:rPr lang="en-US" sz="2000" spc="-1" dirty="0">
+                <a:solidFill>
+                  <a:schemeClr val="dk1"/>
+                </a:solidFill>
+                <a:latin typeface="-apple-system"/>
+              </a:rPr>
+              <a:t>_), the UI updates accordingly (ex: signal </a:t>
+            </a:r>
+            <a:r>
+              <a:rPr lang="en-US" sz="2000" spc="-1" dirty="0" err="1">
+                <a:solidFill>
+                  <a:schemeClr val="dk1"/>
+                </a:solidFill>
+                <a:latin typeface="-apple-system"/>
+              </a:rPr>
+              <a:t>update_</a:t>
+            </a:r>
+            <a:r>
+              <a:rPr lang="en-US" sz="2000" u="sng" spc="-1" dirty="0" err="1">
+                <a:solidFill>
+                  <a:schemeClr val="dk1"/>
+                </a:solidFill>
+                <a:latin typeface="-apple-system"/>
+              </a:rPr>
+              <a:t>blank</a:t>
+            </a:r>
+            <a:r>
+              <a:rPr lang="en-US" sz="2000" spc="-1" dirty="0">
+                <a:solidFill>
+                  <a:schemeClr val="dk1"/>
+                </a:solidFill>
+                <a:latin typeface="-apple-system"/>
+              </a:rPr>
+              <a:t>_).</a:t>
+            </a:r>
           </a:p>
           <a:p>
             <a:pPr marL="228600" indent="-228600" defTabSz="914400">
@@ -13741,7 +13798,7 @@
               </a:tabLst>
             </a:pPr>
             <a:r>
-              <a:rPr lang="en-US" sz="2000" b="0" strike="noStrike" spc="-1">
+              <a:rPr lang="en-US" sz="2000" b="0" strike="noStrike" spc="-1" dirty="0">
                 <a:solidFill>
                   <a:schemeClr val="dk1"/>
                 </a:solidFill>
@@ -13749,7 +13806,7 @@
               </a:rPr>
               <a:t>Conclusion: There are two types of health pickup: apple that restores 1 health, and cherry that restores all health. Coins come in 5 different denominations and the total value is tracked in the HUD.  </a:t>
             </a:r>
-            <a:endParaRPr lang="en-US" sz="2000" b="0" strike="noStrike" spc="-1">
+            <a:endParaRPr lang="en-US" sz="2000" b="0" strike="noStrike" spc="-1" dirty="0">
               <a:solidFill>
                 <a:srgbClr val="FFFFFF"/>
               </a:solidFill>

</xml_diff>

<commit_message>
changed formatting on my slides
</commit_message>
<xml_diff>
--- a/presentation materials/matthews-journey-presentation.pptx
+++ b/presentation materials/matthews-journey-presentation.pptx
@@ -1642,7 +1642,7 @@
               </a:tabLst>
             </a:pPr>
             <a:r>
-              <a:rPr lang="en-US" sz="2000" b="0" strike="noStrike" spc="-1">
+              <a:rPr lang="en-US" sz="2000" b="0" strike="noStrike" spc="-1" dirty="0">
                 <a:solidFill>
                   <a:srgbClr val="000000"/>
                 </a:solidFill>
@@ -14881,7 +14881,7 @@
         </p:nvSpPr>
         <p:spPr>
           <a:xfrm>
-            <a:off x="228600" y="685800"/>
+            <a:off x="188880" y="912960"/>
             <a:ext cx="7315200" cy="5943600"/>
           </a:xfrm>
           <a:prstGeom prst="rect">
@@ -14894,7 +14894,7 @@
         </p:spPr>
         <p:txBody>
           <a:bodyPr lIns="91440" tIns="45720" rIns="91440" bIns="45720" anchor="t">
-            <a:normAutofit fontScale="97499" lnSpcReduction="10000"/>
+            <a:normAutofit fontScale="89999" lnSpcReduction="20000"/>
           </a:bodyPr>
           <a:lstStyle/>
           <a:p>
@@ -14916,6 +14916,31 @@
               </a:solidFill>
               <a:latin typeface="Arial"/>
             </a:endParaRPr>
+          </a:p>
+          <a:p>
+            <a:pPr defTabSz="914400">
+              <a:lnSpc>
+                <a:spcPct val="90000"/>
+              </a:lnSpc>
+              <a:spcBef>
+                <a:spcPts val="1001"/>
+              </a:spcBef>
+              <a:buClr>
+                <a:srgbClr val="FFFFFF"/>
+              </a:buClr>
+              <a:tabLst>
+                <a:tab pos="0" algn="l"/>
+              </a:tabLst>
+            </a:pPr>
+            <a:r>
+              <a:rPr lang="en-US" sz="2000" b="0" strike="noStrike" spc="-1" dirty="0">
+                <a:solidFill>
+                  <a:schemeClr val="dk1"/>
+                </a:solidFill>
+                <a:latin typeface="-apple-system"/>
+              </a:rPr>
+              <a:t>User Story: </a:t>
+            </a:r>
           </a:p>
           <a:p>
             <a:pPr marL="228600" indent="-228600" defTabSz="914400">
@@ -14941,7 +14966,7 @@
                 </a:solidFill>
                 <a:latin typeface="-apple-system"/>
               </a:rPr>
-              <a:t>User Story: - As a player, I want to navigate an environment that's easy to explore with collision that supports my movement and keeps me within bounds.</a:t>
+              <a:t>As a player, I want to navigate an environment that's easy to explore with collision that supports my movement and keeps me within bounds.</a:t>
             </a:r>
             <a:endParaRPr lang="en-US" sz="2000" b="0" strike="noStrike" spc="-1" dirty="0">
               <a:solidFill>
@@ -14949,6 +14974,31 @@
               </a:solidFill>
               <a:latin typeface="Arial"/>
             </a:endParaRPr>
+          </a:p>
+          <a:p>
+            <a:pPr defTabSz="914400">
+              <a:lnSpc>
+                <a:spcPct val="90000"/>
+              </a:lnSpc>
+              <a:spcBef>
+                <a:spcPts val="1001"/>
+              </a:spcBef>
+              <a:buClr>
+                <a:srgbClr val="FFFFFF"/>
+              </a:buClr>
+              <a:tabLst>
+                <a:tab pos="0" algn="l"/>
+              </a:tabLst>
+            </a:pPr>
+            <a:r>
+              <a:rPr lang="en-US" sz="2000" b="0" strike="noStrike" spc="-1" dirty="0">
+                <a:solidFill>
+                  <a:schemeClr val="dk1"/>
+                </a:solidFill>
+                <a:latin typeface="-apple-system"/>
+              </a:rPr>
+              <a:t>Requirement: </a:t>
+            </a:r>
           </a:p>
           <a:p>
             <a:pPr marL="228600" indent="-228600" defTabSz="914400">
@@ -14974,13 +15024,44 @@
                 </a:solidFill>
                 <a:latin typeface="-apple-system"/>
               </a:rPr>
-              <a:t>Requirement: The play area shall have boundaries.</a:t>
+              <a:t>The play area shall have boundaries.</a:t>
             </a:r>
             <a:endParaRPr lang="en-US" sz="2000" b="0" strike="noStrike" spc="-1" dirty="0">
               <a:solidFill>
                 <a:srgbClr val="FFFFFF"/>
               </a:solidFill>
               <a:latin typeface="Arial"/>
+            </a:endParaRPr>
+          </a:p>
+          <a:p>
+            <a:pPr defTabSz="914400">
+              <a:lnSpc>
+                <a:spcPct val="90000"/>
+              </a:lnSpc>
+              <a:spcBef>
+                <a:spcPts val="1001"/>
+              </a:spcBef>
+              <a:buClr>
+                <a:srgbClr val="FFFFFF"/>
+              </a:buClr>
+              <a:tabLst>
+                <a:tab pos="0" algn="l"/>
+              </a:tabLst>
+            </a:pPr>
+            <a:r>
+              <a:rPr lang="en-US" sz="2000" b="0" strike="noStrike" spc="-1" dirty="0">
+                <a:solidFill>
+                  <a:schemeClr val="dk1"/>
+                </a:solidFill>
+                <a:latin typeface="-apple-system"/>
+              </a:rPr>
+              <a:t>Design: </a:t>
+            </a:r>
+            <a:endParaRPr lang="en-US" sz="100" b="0" strike="noStrike" spc="-1" dirty="0">
+              <a:solidFill>
+                <a:schemeClr val="dk1"/>
+              </a:solidFill>
+              <a:latin typeface="-apple-system"/>
             </a:endParaRPr>
           </a:p>
           <a:p>
@@ -15007,7 +15088,7 @@
                 </a:solidFill>
                 <a:latin typeface="-apple-system"/>
               </a:rPr>
-              <a:t>Design: </a:t>
+              <a:t>The player has a fixed camera that keeps the player body at the center of the screen at all times. </a:t>
             </a:r>
           </a:p>
           <a:p>
@@ -15034,7 +15115,7 @@
                 </a:solidFill>
                 <a:latin typeface="-apple-system"/>
               </a:rPr>
-              <a:t>The player has a fixed camera that keeps the player body at the center of the screen at all times. </a:t>
+              <a:t>In order to not break immersion, it's important that the player does not see any blank space in the levels where there is no map. </a:t>
             </a:r>
           </a:p>
           <a:p>
@@ -15061,7 +15142,7 @@
                 </a:solidFill>
                 <a:latin typeface="-apple-system"/>
               </a:rPr>
-              <a:t>In order to not break immersion, it's important that the player does not see any blank space in the levels where there is no map. </a:t>
+              <a:t>To achieve this, there must be a playable area that the player can freely navigate which is enclosed. There will be another area that the player cannot access which functions as a decorative space to hide the edges of the level where the content ends. </a:t>
             </a:r>
           </a:p>
           <a:p>
@@ -15088,7 +15169,7 @@
                 </a:solidFill>
                 <a:latin typeface="-apple-system"/>
               </a:rPr>
-              <a:t>To achieve this, there must be a playable area that the player can freely navigate which is enclosed. There will be another area that the player cannot access which functions as a decorative space to hide the edges of the level where the content ends. </a:t>
+              <a:t>The inaccessible area must be a minimum of half the height or width of the player camera to accurately hide the blank space. </a:t>
             </a:r>
           </a:p>
           <a:p>
@@ -15115,7 +15196,38 @@
                 </a:solidFill>
                 <a:latin typeface="-apple-system"/>
               </a:rPr>
-              <a:t>The inaccessible area must be a minimum of half the height or width of the player camera to accurately hide the blank space. </a:t>
+              <a:t>Achieving this will create immersion and a cohesive game environment.</a:t>
+            </a:r>
+            <a:endParaRPr lang="en-US" sz="2000" b="0" strike="noStrike" spc="-1" dirty="0">
+              <a:solidFill>
+                <a:srgbClr val="FFFFFF"/>
+              </a:solidFill>
+              <a:latin typeface="Arial"/>
+            </a:endParaRPr>
+          </a:p>
+          <a:p>
+            <a:pPr defTabSz="914400">
+              <a:lnSpc>
+                <a:spcPct val="90000"/>
+              </a:lnSpc>
+              <a:spcBef>
+                <a:spcPts val="1001"/>
+              </a:spcBef>
+              <a:buClr>
+                <a:srgbClr val="FFFFFF"/>
+              </a:buClr>
+              <a:tabLst>
+                <a:tab pos="0" algn="l"/>
+              </a:tabLst>
+            </a:pPr>
+            <a:r>
+              <a:rPr lang="en-US" sz="2000" b="0" strike="noStrike" spc="-1" dirty="0">
+                <a:solidFill>
+                  <a:schemeClr val="dk1"/>
+                </a:solidFill>
+                <a:latin typeface="-apple-system"/>
+              </a:rPr>
+              <a:t>Conclusion:</a:t>
             </a:r>
           </a:p>
           <a:p>
@@ -15142,40 +15254,7 @@
                 </a:solidFill>
                 <a:latin typeface="-apple-system"/>
               </a:rPr>
-              <a:t>Achieving this will create immersion and a cohesive game environment.</a:t>
-            </a:r>
-            <a:endParaRPr lang="en-US" sz="2000" b="0" strike="noStrike" spc="-1" dirty="0">
-              <a:solidFill>
-                <a:srgbClr val="FFFFFF"/>
-              </a:solidFill>
-              <a:latin typeface="Arial"/>
-            </a:endParaRPr>
-          </a:p>
-          <a:p>
-            <a:pPr marL="228600" indent="-228600" defTabSz="914400">
-              <a:lnSpc>
-                <a:spcPct val="90000"/>
-              </a:lnSpc>
-              <a:spcBef>
-                <a:spcPts val="1001"/>
-              </a:spcBef>
-              <a:buClr>
-                <a:srgbClr val="FFFFFF"/>
-              </a:buClr>
-              <a:buFont typeface="Arial"/>
-              <a:buChar char="•"/>
-              <a:tabLst>
-                <a:tab pos="0" algn="l"/>
-              </a:tabLst>
-            </a:pPr>
-            <a:r>
-              <a:rPr lang="en-US" sz="2000" b="0" strike="noStrike" spc="-1" dirty="0">
-                <a:solidFill>
-                  <a:schemeClr val="dk1"/>
-                </a:solidFill>
-                <a:latin typeface="-apple-system"/>
-              </a:rPr>
-              <a:t>Conclusion: The map is surrounded by cliffs that act as boundaries with collision so that the player cannot see off the map.</a:t>
+              <a:t>The map is surrounded by cliffs that act as boundaries with collision so that the player cannot see off the map.</a:t>
             </a:r>
             <a:endParaRPr lang="en-US" sz="2000" b="0" strike="noStrike" spc="-1" dirty="0">
               <a:solidFill>

</xml_diff>